<commit_message>
Add some details in threats to validity
</commit_message>
<xml_diff>
--- a/milestones/Group_Presentation_Volatility_Amish.pptx
+++ b/milestones/Group_Presentation_Volatility_Amish.pptx
@@ -212,7 +212,7 @@
           <a:p>
             <a:fld id="{3306547B-373B-42F2-9B6A-41DAAAD10A9A}" type="datetimeFigureOut">
               <a:rPr lang="en-US" smtClean="0"/>
-              <a:t>4/9/2014</a:t>
+              <a:t>4/10/2014</a:t>
             </a:fld>
             <a:endParaRPr lang="en-US"/>
           </a:p>
@@ -819,6 +819,119 @@
 </p:notes>
 </file>
 
+<file path=ppt/notesSlides/notesSlide12.xml><?xml version="1.0" encoding="utf-8"?>
+<p:notes xmlns:a="http://schemas.openxmlformats.org/drawingml/2006/main" xmlns:r="http://schemas.openxmlformats.org/officeDocument/2006/relationships" xmlns:p="http://schemas.openxmlformats.org/presentationml/2006/main">
+  <p:cSld>
+    <p:spTree>
+      <p:nvGrpSpPr>
+        <p:cNvPr id="1" name=""/>
+        <p:cNvGrpSpPr/>
+        <p:nvPr/>
+      </p:nvGrpSpPr>
+      <p:grpSpPr>
+        <a:xfrm>
+          <a:off x="0" y="0"/>
+          <a:ext cx="0" cy="0"/>
+          <a:chOff x="0" y="0"/>
+          <a:chExt cx="0" cy="0"/>
+        </a:xfrm>
+      </p:grpSpPr>
+      <p:sp>
+        <p:nvSpPr>
+          <p:cNvPr id="2" name="Slide Image Placeholder 1"/>
+          <p:cNvSpPr>
+            <a:spLocks noGrp="1" noRot="1" noChangeAspect="1"/>
+          </p:cNvSpPr>
+          <p:nvPr>
+            <p:ph type="sldImg"/>
+          </p:nvPr>
+        </p:nvSpPr>
+        <p:spPr/>
+      </p:sp>
+      <p:sp>
+        <p:nvSpPr>
+          <p:cNvPr id="3" name="Notes Placeholder 2"/>
+          <p:cNvSpPr>
+            <a:spLocks noGrp="1"/>
+          </p:cNvSpPr>
+          <p:nvPr>
+            <p:ph type="body" idx="1"/>
+          </p:nvPr>
+        </p:nvSpPr>
+        <p:spPr/>
+        <p:txBody>
+          <a:bodyPr/>
+          <a:lstStyle/>
+          <a:p>
+            <a:r>
+              <a:rPr lang="en-US" dirty="0" smtClean="0"/>
+              <a:t>Construct – meaningful, measuring the right thing?</a:t>
+            </a:r>
+          </a:p>
+          <a:p>
+            <a:r>
+              <a:rPr lang="en-US" dirty="0" smtClean="0"/>
+              <a:t>Internal – other plausible</a:t>
+            </a:r>
+            <a:r>
+              <a:rPr lang="en-US" baseline="0" dirty="0" smtClean="0"/>
+              <a:t> rival hypothesis</a:t>
+            </a:r>
+          </a:p>
+          <a:p>
+            <a:r>
+              <a:rPr lang="en-US" baseline="0" dirty="0" smtClean="0"/>
+              <a:t>External – generalize </a:t>
+            </a:r>
+          </a:p>
+          <a:p>
+            <a:r>
+              <a:rPr lang="en-US" baseline="0" dirty="0" smtClean="0"/>
+              <a:t>Reliability - repeatable</a:t>
+            </a:r>
+            <a:endParaRPr lang="en-US" dirty="0" smtClean="0"/>
+          </a:p>
+          <a:p>
+            <a:endParaRPr lang="en-US" dirty="0"/>
+          </a:p>
+        </p:txBody>
+      </p:sp>
+      <p:sp>
+        <p:nvSpPr>
+          <p:cNvPr id="4" name="Slide Number Placeholder 3"/>
+          <p:cNvSpPr>
+            <a:spLocks noGrp="1"/>
+          </p:cNvSpPr>
+          <p:nvPr>
+            <p:ph type="sldNum" sz="quarter" idx="10"/>
+          </p:nvPr>
+        </p:nvSpPr>
+        <p:spPr/>
+        <p:txBody>
+          <a:bodyPr/>
+          <a:lstStyle/>
+          <a:p>
+            <a:fld id="{34574B59-0BD7-417A-AEA6-FF8431D8BFDA}" type="slidenum">
+              <a:rPr lang="en-US" smtClean="0"/>
+              <a:t>20</a:t>
+            </a:fld>
+            <a:endParaRPr lang="en-US"/>
+          </a:p>
+        </p:txBody>
+      </p:sp>
+    </p:spTree>
+    <p:extLst>
+      <p:ext uri="{BB962C8B-B14F-4D97-AF65-F5344CB8AC3E}">
+        <p14:creationId xmlns:p14="http://schemas.microsoft.com/office/powerpoint/2010/main" val="1789347153"/>
+      </p:ext>
+    </p:extLst>
+  </p:cSld>
+  <p:clrMapOvr>
+    <a:masterClrMapping/>
+  </p:clrMapOvr>
+</p:notes>
+</file>
+
 <file path=ppt/notesSlides/notesSlide2.xml><?xml version="1.0" encoding="utf-8"?>
 <p:notes xmlns:a="http://schemas.openxmlformats.org/drawingml/2006/main" xmlns:r="http://schemas.openxmlformats.org/officeDocument/2006/relationships" xmlns:p="http://schemas.openxmlformats.org/presentationml/2006/main">
   <p:cSld>
@@ -961,6 +1074,15 @@
               <a:rPr lang="en-CA" baseline="0" dirty="0" smtClean="0"/>
               <a:t> of Java classes into three buckets (HV, MV, LV), we can pose our research questions</a:t>
             </a:r>
+            <a:endParaRPr lang="en-US" baseline="0" dirty="0" smtClean="0"/>
+          </a:p>
+          <a:p>
+            <a:r>
+              <a:rPr lang="en-US" baseline="0" dirty="0" smtClean="0"/>
+              <a:t>Is our second hypothesis really disprovable?</a:t>
+            </a:r>
+          </a:p>
+          <a:p>
             <a:endParaRPr lang="en-US" dirty="0"/>
           </a:p>
         </p:txBody>
@@ -1057,8 +1179,100 @@
           <a:p>
             <a:r>
               <a:rPr lang="en-CA" baseline="0" dirty="0" smtClean="0"/>
-              <a:t>Bring back our main point: we’re investigating whether higher volatility code exhibits lower quality metrics</a:t>
-            </a:r>
+              <a:t>Bring back our main point: we’re </a:t>
+            </a:r>
+            <a:r>
+              <a:rPr lang="en-CA" baseline="0" dirty="0" smtClean="0"/>
+              <a:t>investigating </a:t>
+            </a:r>
+            <a:r>
+              <a:rPr lang="en-CA" baseline="0" dirty="0" smtClean="0"/>
+              <a:t>whether higher volatility code exhibits lower quality </a:t>
+            </a:r>
+            <a:r>
+              <a:rPr lang="en-CA" baseline="0" dirty="0" smtClean="0"/>
+              <a:t>metrics</a:t>
+            </a:r>
+          </a:p>
+          <a:p>
+            <a:endParaRPr lang="en-CA" baseline="0" dirty="0" smtClean="0"/>
+          </a:p>
+          <a:p>
+            <a:pPr lvl="0"/>
+            <a:r>
+              <a:rPr lang="en-US" sz="1200" kern="1200" dirty="0" smtClean="0">
+                <a:solidFill>
+                  <a:schemeClr val="tx1"/>
+                </a:solidFill>
+                <a:effectLst/>
+                <a:latin typeface="+mn-lt"/>
+                <a:ea typeface="+mn-ea"/>
+                <a:cs typeface="+mn-cs"/>
+              </a:rPr>
+              <a:t>Ant Core SVN log:</a:t>
+            </a:r>
+          </a:p>
+          <a:p>
+            <a:pPr lvl="1"/>
+            <a:r>
+              <a:rPr lang="en-US" sz="1200" kern="1200" dirty="0" smtClean="0">
+                <a:solidFill>
+                  <a:schemeClr val="tx1"/>
+                </a:solidFill>
+                <a:effectLst/>
+                <a:latin typeface="+mn-lt"/>
+                <a:ea typeface="+mn-ea"/>
+                <a:cs typeface="+mn-cs"/>
+              </a:rPr>
+              <a:t>149,034 lines</a:t>
+            </a:r>
+          </a:p>
+          <a:p>
+            <a:pPr lvl="1"/>
+            <a:r>
+              <a:rPr lang="en-US" sz="1200" kern="1200" dirty="0" smtClean="0">
+                <a:solidFill>
+                  <a:schemeClr val="tx1"/>
+                </a:solidFill>
+                <a:effectLst/>
+                <a:latin typeface="+mn-lt"/>
+                <a:ea typeface="+mn-ea"/>
+                <a:cs typeface="+mn-cs"/>
+              </a:rPr>
+              <a:t>12,958 commits</a:t>
+            </a:r>
+          </a:p>
+          <a:p>
+            <a:pPr lvl="1"/>
+            <a:r>
+              <a:rPr lang="en-US" sz="1200" kern="1200" dirty="0" smtClean="0">
+                <a:solidFill>
+                  <a:schemeClr val="tx1"/>
+                </a:solidFill>
+                <a:effectLst/>
+                <a:latin typeface="+mn-lt"/>
+                <a:ea typeface="+mn-ea"/>
+                <a:cs typeface="+mn-cs"/>
+              </a:rPr>
+              <a:t>First commit: January 13, 2000</a:t>
+            </a:r>
+          </a:p>
+          <a:p>
+            <a:pPr lvl="1"/>
+            <a:r>
+              <a:rPr lang="en-US" sz="1200" kern="1200" dirty="0" smtClean="0">
+                <a:solidFill>
+                  <a:schemeClr val="tx1"/>
+                </a:solidFill>
+                <a:effectLst/>
+                <a:latin typeface="+mn-lt"/>
+                <a:ea typeface="+mn-ea"/>
+                <a:cs typeface="+mn-cs"/>
+              </a:rPr>
+              <a:t>Last commit: January 27, 2014</a:t>
+            </a:r>
+          </a:p>
+          <a:p>
             <a:endParaRPr lang="en-US" dirty="0"/>
           </a:p>
         </p:txBody>
@@ -1854,7 +2068,7 @@
           <a:p>
             <a:fld id="{0FAA2E9A-8599-42EB-A43E-9B024D98E334}" type="datetimeFigureOut">
               <a:rPr lang="en-US" smtClean="0"/>
-              <a:t>4/9/2014</a:t>
+              <a:t>4/10/2014</a:t>
             </a:fld>
             <a:endParaRPr lang="en-US"/>
           </a:p>
@@ -2024,7 +2238,7 @@
           <a:p>
             <a:fld id="{0FAA2E9A-8599-42EB-A43E-9B024D98E334}" type="datetimeFigureOut">
               <a:rPr lang="en-US" smtClean="0"/>
-              <a:t>4/9/2014</a:t>
+              <a:t>4/10/2014</a:t>
             </a:fld>
             <a:endParaRPr lang="en-US"/>
           </a:p>
@@ -2204,7 +2418,7 @@
           <a:p>
             <a:fld id="{0FAA2E9A-8599-42EB-A43E-9B024D98E334}" type="datetimeFigureOut">
               <a:rPr lang="en-US" smtClean="0"/>
-              <a:t>4/9/2014</a:t>
+              <a:t>4/10/2014</a:t>
             </a:fld>
             <a:endParaRPr lang="en-US"/>
           </a:p>
@@ -2374,7 +2588,7 @@
           <a:p>
             <a:fld id="{0FAA2E9A-8599-42EB-A43E-9B024D98E334}" type="datetimeFigureOut">
               <a:rPr lang="en-US" smtClean="0"/>
-              <a:t>4/9/2014</a:t>
+              <a:t>4/10/2014</a:t>
             </a:fld>
             <a:endParaRPr lang="en-US"/>
           </a:p>
@@ -2620,7 +2834,7 @@
           <a:p>
             <a:fld id="{0FAA2E9A-8599-42EB-A43E-9B024D98E334}" type="datetimeFigureOut">
               <a:rPr lang="en-US" smtClean="0"/>
-              <a:t>4/9/2014</a:t>
+              <a:t>4/10/2014</a:t>
             </a:fld>
             <a:endParaRPr lang="en-US"/>
           </a:p>
@@ -2908,7 +3122,7 @@
           <a:p>
             <a:fld id="{0FAA2E9A-8599-42EB-A43E-9B024D98E334}" type="datetimeFigureOut">
               <a:rPr lang="en-US" smtClean="0"/>
-              <a:t>4/9/2014</a:t>
+              <a:t>4/10/2014</a:t>
             </a:fld>
             <a:endParaRPr lang="en-US"/>
           </a:p>
@@ -3330,7 +3544,7 @@
           <a:p>
             <a:fld id="{0FAA2E9A-8599-42EB-A43E-9B024D98E334}" type="datetimeFigureOut">
               <a:rPr lang="en-US" smtClean="0"/>
-              <a:t>4/9/2014</a:t>
+              <a:t>4/10/2014</a:t>
             </a:fld>
             <a:endParaRPr lang="en-US"/>
           </a:p>
@@ -3448,7 +3662,7 @@
           <a:p>
             <a:fld id="{0FAA2E9A-8599-42EB-A43E-9B024D98E334}" type="datetimeFigureOut">
               <a:rPr lang="en-US" smtClean="0"/>
-              <a:t>4/9/2014</a:t>
+              <a:t>4/10/2014</a:t>
             </a:fld>
             <a:endParaRPr lang="en-US"/>
           </a:p>
@@ -3543,7 +3757,7 @@
           <a:p>
             <a:fld id="{0FAA2E9A-8599-42EB-A43E-9B024D98E334}" type="datetimeFigureOut">
               <a:rPr lang="en-US" smtClean="0"/>
-              <a:t>4/9/2014</a:t>
+              <a:t>4/10/2014</a:t>
             </a:fld>
             <a:endParaRPr lang="en-US"/>
           </a:p>
@@ -3820,7 +4034,7 @@
           <a:p>
             <a:fld id="{0FAA2E9A-8599-42EB-A43E-9B024D98E334}" type="datetimeFigureOut">
               <a:rPr lang="en-US" smtClean="0"/>
-              <a:t>4/9/2014</a:t>
+              <a:t>4/10/2014</a:t>
             </a:fld>
             <a:endParaRPr lang="en-US"/>
           </a:p>
@@ -4073,7 +4287,7 @@
           <a:p>
             <a:fld id="{0FAA2E9A-8599-42EB-A43E-9B024D98E334}" type="datetimeFigureOut">
               <a:rPr lang="en-US" smtClean="0"/>
-              <a:t>4/9/2014</a:t>
+              <a:t>4/10/2014</a:t>
             </a:fld>
             <a:endParaRPr lang="en-US"/>
           </a:p>
@@ -4286,7 +4500,7 @@
           <a:p>
             <a:fld id="{0FAA2E9A-8599-42EB-A43E-9B024D98E334}" type="datetimeFigureOut">
               <a:rPr lang="en-US" smtClean="0"/>
-              <a:t>4/9/2014</a:t>
+              <a:t>4/10/2014</a:t>
             </a:fld>
             <a:endParaRPr lang="en-US"/>
           </a:p>
@@ -4763,13 +4977,13 @@
   <p:clrMapOvr>
     <a:masterClrMapping/>
   </p:clrMapOvr>
-  <mc:AlternateContent xmlns:mc="http://schemas.openxmlformats.org/markup-compatibility/2006">
-    <mc:Choice xmlns:p14="http://schemas.microsoft.com/office/powerpoint/2010/main" Requires="p14">
+  <mc:AlternateContent xmlns:mc="http://schemas.openxmlformats.org/markup-compatibility/2006" xmlns:p14="http://schemas.microsoft.com/office/powerpoint/2010/main">
+    <mc:Choice Requires="p14">
       <p:transition spd="med" p14:dur="700">
         <p:fade/>
       </p:transition>
     </mc:Choice>
-    <mc:Fallback>
+    <mc:Fallback xmlns="">
       <p:transition spd="med">
         <p:fade/>
       </p:transition>
@@ -5050,13 +5264,13 @@
   <p:clrMapOvr>
     <a:masterClrMapping/>
   </p:clrMapOvr>
-  <mc:AlternateContent xmlns:mc="http://schemas.openxmlformats.org/markup-compatibility/2006">
-    <mc:Choice xmlns:p14="http://schemas.microsoft.com/office/powerpoint/2010/main" Requires="p14">
+  <mc:AlternateContent xmlns:mc="http://schemas.openxmlformats.org/markup-compatibility/2006" xmlns:p14="http://schemas.microsoft.com/office/powerpoint/2010/main">
+    <mc:Choice Requires="p14">
       <p:transition spd="med" p14:dur="700">
         <p:fade/>
       </p:transition>
     </mc:Choice>
-    <mc:Fallback>
+    <mc:Fallback xmlns="">
       <p:transition spd="med">
         <p:fade/>
       </p:transition>
@@ -5659,13 +5873,13 @@
   <p:clrMapOvr>
     <a:masterClrMapping/>
   </p:clrMapOvr>
-  <mc:AlternateContent xmlns:mc="http://schemas.openxmlformats.org/markup-compatibility/2006">
-    <mc:Choice xmlns:p14="http://schemas.microsoft.com/office/powerpoint/2010/main" Requires="p14">
+  <mc:AlternateContent xmlns:mc="http://schemas.openxmlformats.org/markup-compatibility/2006" xmlns:p14="http://schemas.microsoft.com/office/powerpoint/2010/main">
+    <mc:Choice Requires="p14">
       <p:transition spd="med" p14:dur="700">
         <p:fade/>
       </p:transition>
     </mc:Choice>
-    <mc:Fallback>
+    <mc:Fallback xmlns="">
       <p:transition spd="med">
         <p:fade/>
       </p:transition>
@@ -5674,7 +5888,385 @@
   <p:timing>
     <p:tnLst>
       <p:par>
-        <p:cTn id="1" dur="indefinite" restart="never" nodeType="tmRoot"/>
+        <p:cTn id="1" dur="indefinite" restart="never" nodeType="tmRoot">
+          <p:childTnLst>
+            <p:seq concurrent="1" nextAc="seek">
+              <p:cTn id="2" dur="indefinite" nodeType="mainSeq">
+                <p:childTnLst>
+                  <p:par>
+                    <p:cTn id="3" fill="hold">
+                      <p:stCondLst>
+                        <p:cond delay="indefinite"/>
+                      </p:stCondLst>
+                      <p:childTnLst>
+                        <p:par>
+                          <p:cTn id="4" fill="hold">
+                            <p:stCondLst>
+                              <p:cond delay="0"/>
+                            </p:stCondLst>
+                            <p:childTnLst>
+                              <p:par>
+                                <p:cTn id="5" presetID="10" presetClass="entr" presetSubtype="0" fill="hold" nodeType="clickEffect">
+                                  <p:stCondLst>
+                                    <p:cond delay="0"/>
+                                  </p:stCondLst>
+                                  <p:childTnLst>
+                                    <p:set>
+                                      <p:cBhvr>
+                                        <p:cTn id="6" dur="1" fill="hold">
+                                          <p:stCondLst>
+                                            <p:cond delay="0"/>
+                                          </p:stCondLst>
+                                        </p:cTn>
+                                        <p:tgtEl>
+                                          <p:spTgt spid="3">
+                                            <p:txEl>
+                                              <p:pRg st="3" end="3"/>
+                                            </p:txEl>
+                                          </p:spTgt>
+                                        </p:tgtEl>
+                                        <p:attrNameLst>
+                                          <p:attrName>style.visibility</p:attrName>
+                                        </p:attrNameLst>
+                                      </p:cBhvr>
+                                      <p:to>
+                                        <p:strVal val="visible"/>
+                                      </p:to>
+                                    </p:set>
+                                    <p:animEffect transition="in" filter="fade">
+                                      <p:cBhvr>
+                                        <p:cTn id="7" dur="500"/>
+                                        <p:tgtEl>
+                                          <p:spTgt spid="3">
+                                            <p:txEl>
+                                              <p:pRg st="3" end="3"/>
+                                            </p:txEl>
+                                          </p:spTgt>
+                                        </p:tgtEl>
+                                      </p:cBhvr>
+                                    </p:animEffect>
+                                  </p:childTnLst>
+                                </p:cTn>
+                              </p:par>
+                              <p:par>
+                                <p:cTn id="8" presetID="10" presetClass="entr" presetSubtype="0" fill="hold" nodeType="withEffect">
+                                  <p:stCondLst>
+                                    <p:cond delay="0"/>
+                                  </p:stCondLst>
+                                  <p:childTnLst>
+                                    <p:set>
+                                      <p:cBhvr>
+                                        <p:cTn id="9" dur="1" fill="hold">
+                                          <p:stCondLst>
+                                            <p:cond delay="0"/>
+                                          </p:stCondLst>
+                                        </p:cTn>
+                                        <p:tgtEl>
+                                          <p:spTgt spid="3">
+                                            <p:txEl>
+                                              <p:pRg st="4" end="4"/>
+                                            </p:txEl>
+                                          </p:spTgt>
+                                        </p:tgtEl>
+                                        <p:attrNameLst>
+                                          <p:attrName>style.visibility</p:attrName>
+                                        </p:attrNameLst>
+                                      </p:cBhvr>
+                                      <p:to>
+                                        <p:strVal val="visible"/>
+                                      </p:to>
+                                    </p:set>
+                                    <p:animEffect transition="in" filter="fade">
+                                      <p:cBhvr>
+                                        <p:cTn id="10" dur="500"/>
+                                        <p:tgtEl>
+                                          <p:spTgt spid="3">
+                                            <p:txEl>
+                                              <p:pRg st="4" end="4"/>
+                                            </p:txEl>
+                                          </p:spTgt>
+                                        </p:tgtEl>
+                                      </p:cBhvr>
+                                    </p:animEffect>
+                                  </p:childTnLst>
+                                </p:cTn>
+                              </p:par>
+                            </p:childTnLst>
+                          </p:cTn>
+                        </p:par>
+                      </p:childTnLst>
+                    </p:cTn>
+                  </p:par>
+                  <p:par>
+                    <p:cTn id="11" fill="hold">
+                      <p:stCondLst>
+                        <p:cond delay="indefinite"/>
+                      </p:stCondLst>
+                      <p:childTnLst>
+                        <p:par>
+                          <p:cTn id="12" fill="hold">
+                            <p:stCondLst>
+                              <p:cond delay="0"/>
+                            </p:stCondLst>
+                            <p:childTnLst>
+                              <p:par>
+                                <p:cTn id="13" presetID="10" presetClass="entr" presetSubtype="0" fill="hold" nodeType="clickEffect">
+                                  <p:stCondLst>
+                                    <p:cond delay="0"/>
+                                  </p:stCondLst>
+                                  <p:childTnLst>
+                                    <p:set>
+                                      <p:cBhvr>
+                                        <p:cTn id="14" dur="1" fill="hold">
+                                          <p:stCondLst>
+                                            <p:cond delay="0"/>
+                                          </p:stCondLst>
+                                        </p:cTn>
+                                        <p:tgtEl>
+                                          <p:spTgt spid="3">
+                                            <p:txEl>
+                                              <p:pRg st="5" end="5"/>
+                                            </p:txEl>
+                                          </p:spTgt>
+                                        </p:tgtEl>
+                                        <p:attrNameLst>
+                                          <p:attrName>style.visibility</p:attrName>
+                                        </p:attrNameLst>
+                                      </p:cBhvr>
+                                      <p:to>
+                                        <p:strVal val="visible"/>
+                                      </p:to>
+                                    </p:set>
+                                    <p:animEffect transition="in" filter="fade">
+                                      <p:cBhvr>
+                                        <p:cTn id="15" dur="500"/>
+                                        <p:tgtEl>
+                                          <p:spTgt spid="3">
+                                            <p:txEl>
+                                              <p:pRg st="5" end="5"/>
+                                            </p:txEl>
+                                          </p:spTgt>
+                                        </p:tgtEl>
+                                      </p:cBhvr>
+                                    </p:animEffect>
+                                  </p:childTnLst>
+                                </p:cTn>
+                              </p:par>
+                              <p:par>
+                                <p:cTn id="16" presetID="10" presetClass="entr" presetSubtype="0" fill="hold" nodeType="withEffect">
+                                  <p:stCondLst>
+                                    <p:cond delay="0"/>
+                                  </p:stCondLst>
+                                  <p:childTnLst>
+                                    <p:set>
+                                      <p:cBhvr>
+                                        <p:cTn id="17" dur="1" fill="hold">
+                                          <p:stCondLst>
+                                            <p:cond delay="0"/>
+                                          </p:stCondLst>
+                                        </p:cTn>
+                                        <p:tgtEl>
+                                          <p:spTgt spid="3">
+                                            <p:txEl>
+                                              <p:pRg st="6" end="6"/>
+                                            </p:txEl>
+                                          </p:spTgt>
+                                        </p:tgtEl>
+                                        <p:attrNameLst>
+                                          <p:attrName>style.visibility</p:attrName>
+                                        </p:attrNameLst>
+                                      </p:cBhvr>
+                                      <p:to>
+                                        <p:strVal val="visible"/>
+                                      </p:to>
+                                    </p:set>
+                                    <p:animEffect transition="in" filter="fade">
+                                      <p:cBhvr>
+                                        <p:cTn id="18" dur="500"/>
+                                        <p:tgtEl>
+                                          <p:spTgt spid="3">
+                                            <p:txEl>
+                                              <p:pRg st="6" end="6"/>
+                                            </p:txEl>
+                                          </p:spTgt>
+                                        </p:tgtEl>
+                                      </p:cBhvr>
+                                    </p:animEffect>
+                                  </p:childTnLst>
+                                </p:cTn>
+                              </p:par>
+                            </p:childTnLst>
+                          </p:cTn>
+                        </p:par>
+                      </p:childTnLst>
+                    </p:cTn>
+                  </p:par>
+                  <p:par>
+                    <p:cTn id="19" fill="hold">
+                      <p:stCondLst>
+                        <p:cond delay="indefinite"/>
+                      </p:stCondLst>
+                      <p:childTnLst>
+                        <p:par>
+                          <p:cTn id="20" fill="hold">
+                            <p:stCondLst>
+                              <p:cond delay="0"/>
+                            </p:stCondLst>
+                            <p:childTnLst>
+                              <p:par>
+                                <p:cTn id="21" presetID="10" presetClass="entr" presetSubtype="0" fill="hold" nodeType="clickEffect">
+                                  <p:stCondLst>
+                                    <p:cond delay="0"/>
+                                  </p:stCondLst>
+                                  <p:childTnLst>
+                                    <p:set>
+                                      <p:cBhvr>
+                                        <p:cTn id="22" dur="1" fill="hold">
+                                          <p:stCondLst>
+                                            <p:cond delay="0"/>
+                                          </p:stCondLst>
+                                        </p:cTn>
+                                        <p:tgtEl>
+                                          <p:spTgt spid="3">
+                                            <p:txEl>
+                                              <p:pRg st="7" end="7"/>
+                                            </p:txEl>
+                                          </p:spTgt>
+                                        </p:tgtEl>
+                                        <p:attrNameLst>
+                                          <p:attrName>style.visibility</p:attrName>
+                                        </p:attrNameLst>
+                                      </p:cBhvr>
+                                      <p:to>
+                                        <p:strVal val="visible"/>
+                                      </p:to>
+                                    </p:set>
+                                    <p:animEffect transition="in" filter="fade">
+                                      <p:cBhvr>
+                                        <p:cTn id="23" dur="500"/>
+                                        <p:tgtEl>
+                                          <p:spTgt spid="3">
+                                            <p:txEl>
+                                              <p:pRg st="7" end="7"/>
+                                            </p:txEl>
+                                          </p:spTgt>
+                                        </p:tgtEl>
+                                      </p:cBhvr>
+                                    </p:animEffect>
+                                  </p:childTnLst>
+                                </p:cTn>
+                              </p:par>
+                              <p:par>
+                                <p:cTn id="24" presetID="10" presetClass="entr" presetSubtype="0" fill="hold" nodeType="withEffect">
+                                  <p:stCondLst>
+                                    <p:cond delay="0"/>
+                                  </p:stCondLst>
+                                  <p:childTnLst>
+                                    <p:set>
+                                      <p:cBhvr>
+                                        <p:cTn id="25" dur="1" fill="hold">
+                                          <p:stCondLst>
+                                            <p:cond delay="0"/>
+                                          </p:stCondLst>
+                                        </p:cTn>
+                                        <p:tgtEl>
+                                          <p:spTgt spid="3">
+                                            <p:txEl>
+                                              <p:pRg st="8" end="8"/>
+                                            </p:txEl>
+                                          </p:spTgt>
+                                        </p:tgtEl>
+                                        <p:attrNameLst>
+                                          <p:attrName>style.visibility</p:attrName>
+                                        </p:attrNameLst>
+                                      </p:cBhvr>
+                                      <p:to>
+                                        <p:strVal val="visible"/>
+                                      </p:to>
+                                    </p:set>
+                                    <p:animEffect transition="in" filter="fade">
+                                      <p:cBhvr>
+                                        <p:cTn id="26" dur="500"/>
+                                        <p:tgtEl>
+                                          <p:spTgt spid="3">
+                                            <p:txEl>
+                                              <p:pRg st="8" end="8"/>
+                                            </p:txEl>
+                                          </p:spTgt>
+                                        </p:tgtEl>
+                                      </p:cBhvr>
+                                    </p:animEffect>
+                                  </p:childTnLst>
+                                </p:cTn>
+                              </p:par>
+                              <p:par>
+                                <p:cTn id="27" presetID="10" presetClass="entr" presetSubtype="0" fill="hold" nodeType="withEffect">
+                                  <p:stCondLst>
+                                    <p:cond delay="0"/>
+                                  </p:stCondLst>
+                                  <p:childTnLst>
+                                    <p:set>
+                                      <p:cBhvr>
+                                        <p:cTn id="28" dur="1" fill="hold">
+                                          <p:stCondLst>
+                                            <p:cond delay="0"/>
+                                          </p:stCondLst>
+                                        </p:cTn>
+                                        <p:tgtEl>
+                                          <p:spTgt spid="3">
+                                            <p:txEl>
+                                              <p:pRg st="9" end="9"/>
+                                            </p:txEl>
+                                          </p:spTgt>
+                                        </p:tgtEl>
+                                        <p:attrNameLst>
+                                          <p:attrName>style.visibility</p:attrName>
+                                        </p:attrNameLst>
+                                      </p:cBhvr>
+                                      <p:to>
+                                        <p:strVal val="visible"/>
+                                      </p:to>
+                                    </p:set>
+                                    <p:animEffect transition="in" filter="fade">
+                                      <p:cBhvr>
+                                        <p:cTn id="29" dur="500"/>
+                                        <p:tgtEl>
+                                          <p:spTgt spid="3">
+                                            <p:txEl>
+                                              <p:pRg st="9" end="9"/>
+                                            </p:txEl>
+                                          </p:spTgt>
+                                        </p:tgtEl>
+                                      </p:cBhvr>
+                                    </p:animEffect>
+                                  </p:childTnLst>
+                                </p:cTn>
+                              </p:par>
+                            </p:childTnLst>
+                          </p:cTn>
+                        </p:par>
+                      </p:childTnLst>
+                    </p:cTn>
+                  </p:par>
+                </p:childTnLst>
+              </p:cTn>
+              <p:prevCondLst>
+                <p:cond evt="onPrev" delay="0">
+                  <p:tgtEl>
+                    <p:sldTgt/>
+                  </p:tgtEl>
+                </p:cond>
+              </p:prevCondLst>
+              <p:nextCondLst>
+                <p:cond evt="onNext" delay="0">
+                  <p:tgtEl>
+                    <p:sldTgt/>
+                  </p:tgtEl>
+                </p:cond>
+              </p:nextCondLst>
+            </p:seq>
+          </p:childTnLst>
+        </p:cTn>
       </p:par>
     </p:tnLst>
   </p:timing>
@@ -5715,11 +6307,7 @@
           <a:p>
             <a:r>
               <a:rPr lang="en-CA" dirty="0" smtClean="0"/>
-              <a:t>Association </a:t>
-            </a:r>
-            <a:r>
-              <a:rPr lang="en-CA" dirty="0" smtClean="0"/>
-              <a:t>Rules /1</a:t>
+              <a:t>Association Rules /1</a:t>
             </a:r>
             <a:endParaRPr lang="en-US" dirty="0"/>
           </a:p>
@@ -5790,7 +6378,6 @@
               <a:rPr lang="en-CA" dirty="0" smtClean="0"/>
               <a:t>Filtered transactions to only include the Java class modification (not addition or deletion)</a:t>
             </a:r>
-            <a:endParaRPr lang="en-CA" dirty="0" smtClean="0"/>
           </a:p>
         </p:txBody>
       </p:sp>
@@ -5804,13 +6391,13 @@
   <p:clrMapOvr>
     <a:masterClrMapping/>
   </p:clrMapOvr>
-  <mc:AlternateContent xmlns:mc="http://schemas.openxmlformats.org/markup-compatibility/2006">
-    <mc:Choice xmlns:p14="http://schemas.microsoft.com/office/powerpoint/2010/main" Requires="p14">
+  <mc:AlternateContent xmlns:mc="http://schemas.openxmlformats.org/markup-compatibility/2006" xmlns:p14="http://schemas.microsoft.com/office/powerpoint/2010/main">
+    <mc:Choice Requires="p14">
       <p:transition spd="med" p14:dur="700">
         <p:fade/>
       </p:transition>
     </mc:Choice>
-    <mc:Fallback>
+    <mc:Fallback xmlns="">
       <p:transition spd="med">
         <p:fade/>
       </p:transition>
@@ -6291,13 +6878,13 @@
   <p:clrMapOvr>
     <a:masterClrMapping/>
   </p:clrMapOvr>
-  <mc:AlternateContent xmlns:mc="http://schemas.openxmlformats.org/markup-compatibility/2006">
-    <mc:Choice xmlns:p14="http://schemas.microsoft.com/office/powerpoint/2010/main" Requires="p14">
+  <mc:AlternateContent xmlns:mc="http://schemas.openxmlformats.org/markup-compatibility/2006" xmlns:p14="http://schemas.microsoft.com/office/powerpoint/2010/main">
+    <mc:Choice Requires="p14">
       <p:transition spd="med" p14:dur="700">
         <p:fade/>
       </p:transition>
     </mc:Choice>
-    <mc:Fallback>
+    <mc:Fallback xmlns="">
       <p:transition spd="med">
         <p:fade/>
       </p:transition>
@@ -6618,13 +7205,13 @@
   <p:clrMapOvr>
     <a:masterClrMapping/>
   </p:clrMapOvr>
-  <mc:AlternateContent xmlns:mc="http://schemas.openxmlformats.org/markup-compatibility/2006">
-    <mc:Choice xmlns:p14="http://schemas.microsoft.com/office/powerpoint/2010/main" Requires="p14">
+  <mc:AlternateContent xmlns:mc="http://schemas.openxmlformats.org/markup-compatibility/2006" xmlns:p14="http://schemas.microsoft.com/office/powerpoint/2010/main">
+    <mc:Choice Requires="p14">
       <p:transition spd="med" p14:dur="700">
         <p:fade/>
       </p:transition>
     </mc:Choice>
-    <mc:Fallback>
+    <mc:Fallback xmlns="">
       <p:transition spd="med">
         <p:fade/>
       </p:transition>
@@ -7302,13 +7889,13 @@
   <p:clrMapOvr>
     <a:masterClrMapping/>
   </p:clrMapOvr>
-  <mc:AlternateContent xmlns:mc="http://schemas.openxmlformats.org/markup-compatibility/2006">
-    <mc:Choice xmlns:p14="http://schemas.microsoft.com/office/powerpoint/2010/main" Requires="p14">
+  <mc:AlternateContent xmlns:mc="http://schemas.openxmlformats.org/markup-compatibility/2006" xmlns:p14="http://schemas.microsoft.com/office/powerpoint/2010/main">
+    <mc:Choice Requires="p14">
       <p:transition spd="med" p14:dur="700">
         <p:fade/>
       </p:transition>
     </mc:Choice>
-    <mc:Fallback>
+    <mc:Fallback xmlns="">
       <p:transition spd="med">
         <p:fade/>
       </p:transition>
@@ -7913,11 +8500,7 @@
           <a:p>
             <a:r>
               <a:rPr lang="en-CA" dirty="0" smtClean="0"/>
-              <a:t>Results: </a:t>
-            </a:r>
-            <a:r>
-              <a:rPr lang="en-CA" dirty="0" smtClean="0"/>
-              <a:t>Pearson Linear Regression -  Correlation between Metrics</a:t>
+              <a:t>Results: Pearson Linear Regression -  Correlation between Metrics</a:t>
             </a:r>
             <a:endParaRPr lang="en-US" dirty="0"/>
           </a:p>
@@ -11614,13 +12197,13 @@
   <p:clrMapOvr>
     <a:masterClrMapping/>
   </p:clrMapOvr>
-  <mc:AlternateContent xmlns:mc="http://schemas.openxmlformats.org/markup-compatibility/2006">
-    <mc:Choice xmlns:p14="http://schemas.microsoft.com/office/powerpoint/2010/main" Requires="p14">
+  <mc:AlternateContent xmlns:mc="http://schemas.openxmlformats.org/markup-compatibility/2006" xmlns:p14="http://schemas.microsoft.com/office/powerpoint/2010/main">
+    <mc:Choice Requires="p14">
       <p:transition spd="med" p14:dur="700">
         <p:fade/>
       </p:transition>
     </mc:Choice>
-    <mc:Fallback>
+    <mc:Fallback xmlns="">
       <p:transition spd="med">
         <p:fade/>
       </p:transition>
@@ -11804,13 +12387,13 @@
   <p:clrMapOvr>
     <a:masterClrMapping/>
   </p:clrMapOvr>
-  <mc:AlternateContent xmlns:mc="http://schemas.openxmlformats.org/markup-compatibility/2006">
-    <mc:Choice xmlns:p14="http://schemas.microsoft.com/office/powerpoint/2010/main" Requires="p14">
+  <mc:AlternateContent xmlns:mc="http://schemas.openxmlformats.org/markup-compatibility/2006" xmlns:p14="http://schemas.microsoft.com/office/powerpoint/2010/main">
+    <mc:Choice Requires="p14">
       <p:transition spd="med" p14:dur="700">
         <p:fade/>
       </p:transition>
     </mc:Choice>
-    <mc:Fallback>
+    <mc:Fallback xmlns="">
       <p:transition spd="med">
         <p:fade/>
       </p:transition>
@@ -12192,15 +12775,7 @@
           <a:p>
             <a:r>
               <a:rPr lang="en-CA" sz="2800" dirty="0" smtClean="0"/>
-              <a:t>Computing </a:t>
-            </a:r>
-            <a:r>
-              <a:rPr lang="en-CA" sz="2800" dirty="0" smtClean="0"/>
-              <a:t>the association rules required large computing power </a:t>
-            </a:r>
-            <a:r>
-              <a:rPr lang="en-CA" sz="2800" dirty="0" smtClean="0"/>
-              <a:t>and quite some processing time</a:t>
+              <a:t>Computing the association rules required large computing power and quite some processing time</a:t>
             </a:r>
             <a:endParaRPr lang="en-US" sz="2800" dirty="0"/>
           </a:p>
@@ -12276,13 +12851,13 @@
   <p:clrMapOvr>
     <a:masterClrMapping/>
   </p:clrMapOvr>
-  <mc:AlternateContent xmlns:mc="http://schemas.openxmlformats.org/markup-compatibility/2006">
-    <mc:Choice xmlns:p14="http://schemas.microsoft.com/office/powerpoint/2010/main" Requires="p14">
+  <mc:AlternateContent xmlns:mc="http://schemas.openxmlformats.org/markup-compatibility/2006" xmlns:p14="http://schemas.microsoft.com/office/powerpoint/2010/main">
+    <mc:Choice Requires="p14">
       <p:transition spd="med" p14:dur="700">
         <p:fade/>
       </p:transition>
     </mc:Choice>
-    <mc:Fallback>
+    <mc:Fallback xmlns="">
       <p:transition spd="med">
         <p:fade/>
       </p:transition>
@@ -12677,13 +13252,13 @@
   <p:clrMapOvr>
     <a:masterClrMapping/>
   </p:clrMapOvr>
-  <mc:AlternateContent xmlns:mc="http://schemas.openxmlformats.org/markup-compatibility/2006">
-    <mc:Choice xmlns:p14="http://schemas.microsoft.com/office/powerpoint/2010/main" Requires="p14">
+  <mc:AlternateContent xmlns:mc="http://schemas.openxmlformats.org/markup-compatibility/2006" xmlns:p14="http://schemas.microsoft.com/office/powerpoint/2010/main">
+    <mc:Choice Requires="p14">
       <p:transition spd="med" p14:dur="700">
         <p:fade/>
       </p:transition>
     </mc:Choice>
-    <mc:Fallback>
+    <mc:Fallback xmlns="">
       <p:transition spd="med">
         <p:fade/>
       </p:transition>
@@ -13234,13 +13809,13 @@
   <p:clrMapOvr>
     <a:masterClrMapping/>
   </p:clrMapOvr>
-  <mc:AlternateContent xmlns:mc="http://schemas.openxmlformats.org/markup-compatibility/2006">
-    <mc:Choice xmlns:p14="http://schemas.microsoft.com/office/powerpoint/2010/main" Requires="p14">
+  <mc:AlternateContent xmlns:mc="http://schemas.openxmlformats.org/markup-compatibility/2006" xmlns:p14="http://schemas.microsoft.com/office/powerpoint/2010/main">
+    <mc:Choice Requires="p14">
       <p:transition spd="med" p14:dur="700">
         <p:fade/>
       </p:transition>
     </mc:Choice>
-    <mc:Fallback>
+    <mc:Fallback xmlns="">
       <p:transition spd="med">
         <p:fade/>
       </p:transition>
@@ -13309,32 +13884,38 @@
         <p:spPr/>
         <p:txBody>
           <a:bodyPr>
-            <a:normAutofit fontScale="92500" lnSpcReduction="10000"/>
+            <a:normAutofit/>
           </a:bodyPr>
           <a:lstStyle/>
           <a:p>
             <a:r>
-              <a:rPr lang="en-CA" dirty="0" smtClean="0"/>
+              <a:rPr lang="en-CA" b="1" dirty="0" smtClean="0"/>
               <a:t>Construct</a:t>
             </a:r>
           </a:p>
           <a:p>
             <a:pPr lvl="1"/>
             <a:r>
-              <a:rPr lang="en-CA" dirty="0" smtClean="0"/>
-              <a:t>The time between each successive release was not uniform (varied between 1.5 years to 4 years)</a:t>
-            </a:r>
-            <a:endParaRPr lang="en-CA" dirty="0" smtClean="0"/>
-          </a:p>
-          <a:p>
-            <a:r>
-              <a:rPr lang="en-CA" dirty="0" smtClean="0"/>
-              <a:t>Internal</a:t>
-            </a:r>
-          </a:p>
-          <a:p>
-            <a:r>
-              <a:rPr lang="en-CA" dirty="0" smtClean="0"/>
+              <a:rPr lang="en-US" dirty="0" smtClean="0"/>
+              <a:t>Association </a:t>
+            </a:r>
+            <a:r>
+              <a:rPr lang="en-US" dirty="0"/>
+              <a:t>rules based only on </a:t>
+            </a:r>
+            <a:r>
+              <a:rPr lang="en-US" i="1" dirty="0"/>
+              <a:t>4 versions </a:t>
+            </a:r>
+            <a:r>
+              <a:rPr lang="en-US" dirty="0"/>
+              <a:t>(3 collections of files) </a:t>
+            </a:r>
+            <a:endParaRPr lang="en-CA" dirty="0"/>
+          </a:p>
+          <a:p>
+            <a:r>
+              <a:rPr lang="en-CA" b="1" dirty="0" smtClean="0"/>
               <a:t>External</a:t>
             </a:r>
           </a:p>
@@ -13344,33 +13925,6 @@
               <a:rPr lang="en-CA" dirty="0" smtClean="0"/>
               <a:t>Only used 1 project (should also repeat this on other OSS projects)</a:t>
             </a:r>
-            <a:endParaRPr lang="en-CA" dirty="0" smtClean="0"/>
-          </a:p>
-          <a:p>
-            <a:r>
-              <a:rPr lang="en-CA" dirty="0" smtClean="0"/>
-              <a:t>Reliability</a:t>
-            </a:r>
-          </a:p>
-          <a:p>
-            <a:pPr lvl="1"/>
-            <a:r>
-              <a:rPr lang="en-CA" dirty="0" smtClean="0"/>
-              <a:t>Association rules based only on 4 versions (</a:t>
-            </a:r>
-            <a:r>
-              <a:rPr lang="en-CA" dirty="0" smtClean="0">
-                <a:solidFill>
-                  <a:srgbClr val="FF0000"/>
-                </a:solidFill>
-              </a:rPr>
-              <a:t>3 collections of files</a:t>
-            </a:r>
-            <a:r>
-              <a:rPr lang="en-CA" dirty="0" smtClean="0"/>
-              <a:t>)</a:t>
-            </a:r>
-            <a:endParaRPr lang="en-CA" dirty="0" smtClean="0"/>
           </a:p>
           <a:p>
             <a:endParaRPr lang="en-US" dirty="0"/>
@@ -13387,13 +13941,13 @@
   <p:clrMapOvr>
     <a:masterClrMapping/>
   </p:clrMapOvr>
-  <mc:AlternateContent xmlns:mc="http://schemas.openxmlformats.org/markup-compatibility/2006">
-    <mc:Choice xmlns:p14="http://schemas.microsoft.com/office/powerpoint/2010/main" Requires="p14">
+  <mc:AlternateContent xmlns:mc="http://schemas.openxmlformats.org/markup-compatibility/2006" xmlns:p14="http://schemas.microsoft.com/office/powerpoint/2010/main">
+    <mc:Choice Requires="p14">
       <p:transition spd="med" p14:dur="700">
         <p:fade/>
       </p:transition>
     </mc:Choice>
-    <mc:Fallback>
+    <mc:Fallback xmlns="">
       <p:transition spd="med">
         <p:fade/>
       </p:transition>
@@ -13462,42 +14016,115 @@
         <p:spPr/>
         <p:txBody>
           <a:bodyPr>
-            <a:normAutofit fontScale="92500"/>
+            <a:normAutofit fontScale="85000" lnSpcReduction="10000"/>
           </a:bodyPr>
           <a:lstStyle/>
           <a:p>
             <a:r>
               <a:rPr lang="en-CA" dirty="0" smtClean="0"/>
-              <a:t>Over multiple versions of Apache Ant, i</a:t>
+              <a:t>Over multiple versions of Apache Ant, it was clear that </a:t>
+            </a:r>
+            <a:r>
+              <a:rPr lang="en-CA" b="1" dirty="0" smtClean="0">
+                <a:ln w="1905"/>
+                <a:gradFill>
+                  <a:gsLst>
+                    <a:gs pos="0">
+                      <a:schemeClr val="accent6">
+                        <a:shade val="20000"/>
+                        <a:satMod val="200000"/>
+                      </a:schemeClr>
+                    </a:gs>
+                    <a:gs pos="78000">
+                      <a:schemeClr val="accent6">
+                        <a:tint val="90000"/>
+                        <a:shade val="89000"/>
+                        <a:satMod val="220000"/>
+                      </a:schemeClr>
+                    </a:gs>
+                    <a:gs pos="100000">
+                      <a:schemeClr val="accent6">
+                        <a:tint val="12000"/>
+                        <a:satMod val="255000"/>
+                      </a:schemeClr>
+                    </a:gs>
+                  </a:gsLst>
+                  <a:lin ang="5400000"/>
+                </a:gradFill>
+                <a:effectLst>
+                  <a:innerShdw blurRad="69850" dist="43180" dir="5400000">
+                    <a:srgbClr val="000000">
+                      <a:alpha val="65000"/>
+                    </a:srgbClr>
+                  </a:innerShdw>
+                </a:effectLst>
+              </a:rPr>
+              <a:t>more volatile code tended to exhibit lower quality metrics</a:t>
             </a:r>
             <a:r>
               <a:rPr lang="en-CA" dirty="0" smtClean="0"/>
-              <a:t>t </a:t>
-            </a:r>
+              <a:t> (C&amp;K + MOOD)</a:t>
+            </a:r>
+          </a:p>
+          <a:p>
+            <a:pPr lvl="1"/>
             <a:r>
               <a:rPr lang="en-CA" dirty="0" smtClean="0"/>
-              <a:t>was clear that more volatile code </a:t>
-            </a:r>
+              <a:t>Can use this information to target classes for refactoring and better unit testing</a:t>
+            </a:r>
+          </a:p>
+          <a:p>
+            <a:pPr lvl="1"/>
             <a:r>
               <a:rPr lang="en-CA" dirty="0" smtClean="0"/>
-              <a:t>tended </a:t>
-            </a:r>
+              <a:t>Adds another dimension when prioritizing what to tackle</a:t>
+            </a:r>
+          </a:p>
+          <a:p>
             <a:r>
               <a:rPr lang="en-CA" dirty="0" smtClean="0"/>
-              <a:t>to exhibit lower quality </a:t>
+              <a:t>Based on historical SVN data, we </a:t>
+            </a:r>
+            <a:r>
+              <a:rPr lang="en-CA" b="1" dirty="0" smtClean="0">
+                <a:ln w="1905"/>
+                <a:gradFill>
+                  <a:gsLst>
+                    <a:gs pos="0">
+                      <a:schemeClr val="accent6">
+                        <a:shade val="20000"/>
+                        <a:satMod val="200000"/>
+                      </a:schemeClr>
+                    </a:gs>
+                    <a:gs pos="78000">
+                      <a:schemeClr val="accent6">
+                        <a:tint val="90000"/>
+                        <a:shade val="89000"/>
+                        <a:satMod val="220000"/>
+                      </a:schemeClr>
+                    </a:gs>
+                    <a:gs pos="100000">
+                      <a:schemeClr val="accent6">
+                        <a:tint val="12000"/>
+                        <a:satMod val="255000"/>
+                      </a:schemeClr>
+                    </a:gs>
+                  </a:gsLst>
+                  <a:lin ang="5400000"/>
+                </a:gradFill>
+                <a:effectLst>
+                  <a:innerShdw blurRad="69850" dist="43180" dir="5400000">
+                    <a:srgbClr val="000000">
+                      <a:alpha val="65000"/>
+                    </a:srgbClr>
+                  </a:innerShdw>
+                </a:effectLst>
+              </a:rPr>
+              <a:t>attempted to build a prediction model</a:t>
             </a:r>
             <a:r>
               <a:rPr lang="en-CA" dirty="0" smtClean="0"/>
-              <a:t>metrics (C&amp;K + MOOD)</a:t>
-            </a:r>
-          </a:p>
-          <a:p>
-            <a:endParaRPr lang="en-CA" dirty="0" smtClean="0"/>
-          </a:p>
-          <a:p>
-            <a:r>
-              <a:rPr lang="en-CA" dirty="0" smtClean="0"/>
-              <a:t>Based on historical SVN data, we attempted to build a prediction model using association rules</a:t>
+              <a:t> using association rules</a:t>
             </a:r>
           </a:p>
           <a:p>
@@ -13533,7 +14160,6 @@
               <a:rPr lang="en-CA" dirty="0" smtClean="0"/>
               <a:t>the developer / team</a:t>
             </a:r>
-            <a:endParaRPr lang="en-CA" dirty="0" smtClean="0"/>
           </a:p>
           <a:p>
             <a:endParaRPr lang="en-US" dirty="0"/>
@@ -13550,13 +14176,13 @@
   <p:clrMapOvr>
     <a:masterClrMapping/>
   </p:clrMapOvr>
-  <mc:AlternateContent xmlns:mc="http://schemas.openxmlformats.org/markup-compatibility/2006">
-    <mc:Choice xmlns:p14="http://schemas.microsoft.com/office/powerpoint/2010/main" Requires="p14">
+  <mc:AlternateContent xmlns:mc="http://schemas.openxmlformats.org/markup-compatibility/2006" xmlns:p14="http://schemas.microsoft.com/office/powerpoint/2010/main">
+    <mc:Choice Requires="p14">
       <p:transition spd="med" p14:dur="700">
         <p:fade/>
       </p:transition>
     </mc:Choice>
-    <mc:Fallback>
+    <mc:Fallback xmlns="">
       <p:transition spd="med">
         <p:fade/>
       </p:transition>
@@ -13659,7 +14285,7 @@
                                         <p:tgtEl>
                                           <p:spTgt spid="3">
                                             <p:txEl>
-                                              <p:pRg st="2" end="2"/>
+                                              <p:pRg st="1" end="1"/>
                                             </p:txEl>
                                           </p:spTgt>
                                         </p:tgtEl>
@@ -13677,6 +14303,67 @@
                                         <p:tgtEl>
                                           <p:spTgt spid="3">
                                             <p:txEl>
+                                              <p:pRg st="1" end="1"/>
+                                            </p:txEl>
+                                          </p:spTgt>
+                                        </p:tgtEl>
+                                      </p:cBhvr>
+                                    </p:animEffect>
+                                  </p:childTnLst>
+                                </p:cTn>
+                              </p:par>
+                            </p:childTnLst>
+                          </p:cTn>
+                        </p:par>
+                      </p:childTnLst>
+                    </p:cTn>
+                  </p:par>
+                  <p:par>
+                    <p:cTn id="13" fill="hold">
+                      <p:stCondLst>
+                        <p:cond delay="indefinite"/>
+                      </p:stCondLst>
+                      <p:childTnLst>
+                        <p:par>
+                          <p:cTn id="14" fill="hold">
+                            <p:stCondLst>
+                              <p:cond delay="0"/>
+                            </p:stCondLst>
+                            <p:childTnLst>
+                              <p:par>
+                                <p:cTn id="15" presetID="10" presetClass="entr" presetSubtype="0" fill="hold" nodeType="clickEffect">
+                                  <p:stCondLst>
+                                    <p:cond delay="0"/>
+                                  </p:stCondLst>
+                                  <p:childTnLst>
+                                    <p:set>
+                                      <p:cBhvr>
+                                        <p:cTn id="16" dur="1" fill="hold">
+                                          <p:stCondLst>
+                                            <p:cond delay="0"/>
+                                          </p:stCondLst>
+                                        </p:cTn>
+                                        <p:tgtEl>
+                                          <p:spTgt spid="3">
+                                            <p:txEl>
+                                              <p:pRg st="2" end="2"/>
+                                            </p:txEl>
+                                          </p:spTgt>
+                                        </p:tgtEl>
+                                        <p:attrNameLst>
+                                          <p:attrName>style.visibility</p:attrName>
+                                        </p:attrNameLst>
+                                      </p:cBhvr>
+                                      <p:to>
+                                        <p:strVal val="visible"/>
+                                      </p:to>
+                                    </p:set>
+                                    <p:animEffect transition="in" filter="fade">
+                                      <p:cBhvr>
+                                        <p:cTn id="17" dur="500"/>
+                                        <p:tgtEl>
+                                          <p:spTgt spid="3">
+                                            <p:txEl>
                                               <p:pRg st="2" end="2"/>
                                             </p:txEl>
                                           </p:spTgt>
@@ -13686,15 +14373,33 @@
                                   </p:childTnLst>
                                 </p:cTn>
                               </p:par>
+                            </p:childTnLst>
+                          </p:cTn>
+                        </p:par>
+                      </p:childTnLst>
+                    </p:cTn>
+                  </p:par>
+                  <p:par>
+                    <p:cTn id="18" fill="hold">
+                      <p:stCondLst>
+                        <p:cond delay="indefinite"/>
+                      </p:stCondLst>
+                      <p:childTnLst>
+                        <p:par>
+                          <p:cTn id="19" fill="hold">
+                            <p:stCondLst>
+                              <p:cond delay="0"/>
+                            </p:stCondLst>
+                            <p:childTnLst>
                               <p:par>
-                                <p:cTn id="13" presetID="10" presetClass="entr" presetSubtype="0" fill="hold" nodeType="withEffect">
+                                <p:cTn id="20" presetID="10" presetClass="entr" presetSubtype="0" fill="hold" nodeType="clickEffect">
                                   <p:stCondLst>
                                     <p:cond delay="0"/>
                                   </p:stCondLst>
                                   <p:childTnLst>
                                     <p:set>
                                       <p:cBhvr>
-                                        <p:cTn id="14" dur="1" fill="hold">
+                                        <p:cTn id="21" dur="1" fill="hold">
                                           <p:stCondLst>
                                             <p:cond delay="0"/>
                                           </p:stCondLst>
@@ -13716,7 +14421,7 @@
                                     </p:set>
                                     <p:animEffect transition="in" filter="fade">
                                       <p:cBhvr>
-                                        <p:cTn id="15" dur="500"/>
+                                        <p:cTn id="22" dur="500"/>
                                         <p:tgtEl>
                                           <p:spTgt spid="3">
                                             <p:txEl>
@@ -13730,14 +14435,14 @@
                                 </p:cTn>
                               </p:par>
                               <p:par>
-                                <p:cTn id="16" presetID="10" presetClass="entr" presetSubtype="0" fill="hold" nodeType="withEffect">
+                                <p:cTn id="23" presetID="10" presetClass="entr" presetSubtype="0" fill="hold" nodeType="withEffect">
                                   <p:stCondLst>
                                     <p:cond delay="0"/>
                                   </p:stCondLst>
                                   <p:childTnLst>
                                     <p:set>
                                       <p:cBhvr>
-                                        <p:cTn id="17" dur="1" fill="hold">
+                                        <p:cTn id="24" dur="1" fill="hold">
                                           <p:stCondLst>
                                             <p:cond delay="0"/>
                                           </p:stCondLst>
@@ -13759,11 +14464,54 @@
                                     </p:set>
                                     <p:animEffect transition="in" filter="fade">
                                       <p:cBhvr>
-                                        <p:cTn id="18" dur="500"/>
+                                        <p:cTn id="25" dur="500"/>
                                         <p:tgtEl>
                                           <p:spTgt spid="3">
                                             <p:txEl>
                                               <p:pRg st="4" end="4"/>
+                                            </p:txEl>
+                                          </p:spTgt>
+                                        </p:tgtEl>
+                                      </p:cBhvr>
+                                    </p:animEffect>
+                                  </p:childTnLst>
+                                </p:cTn>
+                              </p:par>
+                              <p:par>
+                                <p:cTn id="26" presetID="10" presetClass="entr" presetSubtype="0" fill="hold" nodeType="withEffect">
+                                  <p:stCondLst>
+                                    <p:cond delay="0"/>
+                                  </p:stCondLst>
+                                  <p:childTnLst>
+                                    <p:set>
+                                      <p:cBhvr>
+                                        <p:cTn id="27" dur="1" fill="hold">
+                                          <p:stCondLst>
+                                            <p:cond delay="0"/>
+                                          </p:stCondLst>
+                                        </p:cTn>
+                                        <p:tgtEl>
+                                          <p:spTgt spid="3">
+                                            <p:txEl>
+                                              <p:pRg st="5" end="5"/>
+                                            </p:txEl>
+                                          </p:spTgt>
+                                        </p:tgtEl>
+                                        <p:attrNameLst>
+                                          <p:attrName>style.visibility</p:attrName>
+                                        </p:attrNameLst>
+                                      </p:cBhvr>
+                                      <p:to>
+                                        <p:strVal val="visible"/>
+                                      </p:to>
+                                    </p:set>
+                                    <p:animEffect transition="in" filter="fade">
+                                      <p:cBhvr>
+                                        <p:cTn id="28" dur="500"/>
+                                        <p:tgtEl>
+                                          <p:spTgt spid="3">
+                                            <p:txEl>
+                                              <p:pRg st="5" end="5"/>
                                             </p:txEl>
                                           </p:spTgt>
                                         </p:tgtEl>
@@ -14690,13 +15438,13 @@
   <p:clrMapOvr>
     <a:masterClrMapping/>
   </p:clrMapOvr>
-  <mc:AlternateContent xmlns:mc="http://schemas.openxmlformats.org/markup-compatibility/2006">
-    <mc:Choice xmlns:p14="http://schemas.microsoft.com/office/powerpoint/2010/main" Requires="p14">
+  <mc:AlternateContent xmlns:mc="http://schemas.openxmlformats.org/markup-compatibility/2006" xmlns:p14="http://schemas.microsoft.com/office/powerpoint/2010/main">
+    <mc:Choice Requires="p14">
       <p:transition spd="med" p14:dur="700">
         <p:fade/>
       </p:transition>
     </mc:Choice>
-    <mc:Fallback>
+    <mc:Fallback xmlns="">
       <p:transition spd="med">
         <p:fade/>
       </p:transition>
@@ -15985,13 +16733,13 @@
   <p:clrMapOvr>
     <a:masterClrMapping/>
   </p:clrMapOvr>
-  <mc:AlternateContent xmlns:mc="http://schemas.openxmlformats.org/markup-compatibility/2006">
-    <mc:Choice xmlns:p14="http://schemas.microsoft.com/office/powerpoint/2010/main" Requires="p14">
+  <mc:AlternateContent xmlns:mc="http://schemas.openxmlformats.org/markup-compatibility/2006" xmlns:p14="http://schemas.microsoft.com/office/powerpoint/2010/main">
+    <mc:Choice Requires="p14">
       <p:transition spd="med" p14:dur="700">
         <p:fade/>
       </p:transition>
     </mc:Choice>
-    <mc:Fallback>
+    <mc:Fallback xmlns="">
       <p:transition spd="med">
         <p:fade/>
       </p:transition>
@@ -16682,15 +17430,7 @@
           <a:p>
             <a:r>
               <a:rPr lang="en-US" dirty="0" smtClean="0"/>
-              <a:t>Based on </a:t>
-            </a:r>
-            <a:r>
-              <a:rPr lang="en-US" dirty="0" smtClean="0"/>
-              <a:t>association </a:t>
-            </a:r>
-            <a:r>
-              <a:rPr lang="en-US" dirty="0" smtClean="0"/>
-              <a:t>rules, can we build a practical change propensity model?</a:t>
+              <a:t>Based on association rules, can we build a practical change propensity model?</a:t>
             </a:r>
           </a:p>
           <a:p>
@@ -16701,15 +17441,7 @@
             </a:r>
             <a:r>
               <a:rPr lang="en-CA" dirty="0" smtClean="0"/>
-              <a:t>: Based on </a:t>
-            </a:r>
-            <a:r>
-              <a:rPr lang="en-CA" dirty="0" smtClean="0"/>
-              <a:t>association rules and historical data, </a:t>
-            </a:r>
-            <a:r>
-              <a:rPr lang="en-CA" dirty="0" smtClean="0"/>
-              <a:t>we can </a:t>
+              <a:t>: Based on association rules and historical data, we can </a:t>
             </a:r>
             <a:r>
               <a:rPr lang="en-CA" b="1" dirty="0" smtClean="0">
@@ -16746,44 +17478,7 @@
                   </a:innerShdw>
                 </a:effectLst>
               </a:rPr>
-              <a:t>predict which classes may also </a:t>
-            </a:r>
-            <a:r>
-              <a:rPr lang="en-CA" b="1" dirty="0" smtClean="0">
-                <a:ln w="1905"/>
-                <a:gradFill>
-                  <a:gsLst>
-                    <a:gs pos="0">
-                      <a:schemeClr val="accent6">
-                        <a:shade val="20000"/>
-                        <a:satMod val="200000"/>
-                      </a:schemeClr>
-                    </a:gs>
-                    <a:gs pos="78000">
-                      <a:schemeClr val="accent6">
-                        <a:tint val="90000"/>
-                        <a:shade val="89000"/>
-                        <a:satMod val="220000"/>
-                      </a:schemeClr>
-                    </a:gs>
-                    <a:gs pos="100000">
-                      <a:schemeClr val="accent6">
-                        <a:tint val="12000"/>
-                        <a:satMod val="255000"/>
-                      </a:schemeClr>
-                    </a:gs>
-                  </a:gsLst>
-                  <a:lin ang="5400000"/>
-                </a:gradFill>
-                <a:effectLst>
-                  <a:innerShdw blurRad="69850" dist="43180" dir="5400000">
-                    <a:srgbClr val="000000">
-                      <a:alpha val="65000"/>
-                    </a:srgbClr>
-                  </a:innerShdw>
-                </a:effectLst>
-              </a:rPr>
-              <a:t>change </a:t>
+              <a:t>predict which classes may also change </a:t>
             </a:r>
             <a:r>
               <a:rPr lang="en-CA" dirty="0"/>
@@ -16803,13 +17498,13 @@
   <p:clrMapOvr>
     <a:masterClrMapping/>
   </p:clrMapOvr>
-  <mc:AlternateContent xmlns:mc="http://schemas.openxmlformats.org/markup-compatibility/2006">
-    <mc:Choice xmlns:p14="http://schemas.microsoft.com/office/powerpoint/2010/main" Requires="p14">
+  <mc:AlternateContent xmlns:mc="http://schemas.openxmlformats.org/markup-compatibility/2006" xmlns:p14="http://schemas.microsoft.com/office/powerpoint/2010/main">
+    <mc:Choice Requires="p14">
       <p:transition spd="med" p14:dur="700">
         <p:fade/>
       </p:transition>
     </mc:Choice>
-    <mc:Fallback>
+    <mc:Fallback xmlns="">
       <p:transition spd="med">
         <p:fade/>
       </p:transition>
@@ -17129,13 +17824,13 @@
   <p:clrMapOvr>
     <a:masterClrMapping/>
   </p:clrMapOvr>
-  <mc:AlternateContent xmlns:mc="http://schemas.openxmlformats.org/markup-compatibility/2006">
-    <mc:Choice xmlns:p14="http://schemas.microsoft.com/office/powerpoint/2010/main" Requires="p14">
+  <mc:AlternateContent xmlns:mc="http://schemas.openxmlformats.org/markup-compatibility/2006" xmlns:p14="http://schemas.microsoft.com/office/powerpoint/2010/main">
+    <mc:Choice Requires="p14">
       <p:transition spd="med" p14:dur="700">
         <p:fade/>
       </p:transition>
     </mc:Choice>
-    <mc:Fallback>
+    <mc:Fallback xmlns="">
       <p:transition spd="med">
         <p:fade/>
       </p:transition>
@@ -17517,13 +18212,13 @@
   <p:clrMapOvr>
     <a:masterClrMapping/>
   </p:clrMapOvr>
-  <mc:AlternateContent xmlns:mc="http://schemas.openxmlformats.org/markup-compatibility/2006">
-    <mc:Choice xmlns:p14="http://schemas.microsoft.com/office/powerpoint/2010/main" Requires="p14">
+  <mc:AlternateContent xmlns:mc="http://schemas.openxmlformats.org/markup-compatibility/2006" xmlns:p14="http://schemas.microsoft.com/office/powerpoint/2010/main">
+    <mc:Choice Requires="p14">
       <p:transition spd="med" p14:dur="700">
         <p:fade/>
       </p:transition>
     </mc:Choice>
-    <mc:Fallback>
+    <mc:Fallback xmlns="">
       <p:transition spd="med">
         <p:fade/>
       </p:transition>
@@ -18179,13 +18874,13 @@
   <p:clrMapOvr>
     <a:masterClrMapping/>
   </p:clrMapOvr>
-  <mc:AlternateContent xmlns:mc="http://schemas.openxmlformats.org/markup-compatibility/2006">
-    <mc:Choice xmlns:p14="http://schemas.microsoft.com/office/powerpoint/2010/main" Requires="p14">
+  <mc:AlternateContent xmlns:mc="http://schemas.openxmlformats.org/markup-compatibility/2006" xmlns:p14="http://schemas.microsoft.com/office/powerpoint/2010/main">
+    <mc:Choice Requires="p14">
       <p:transition spd="med" p14:dur="700">
         <p:fade/>
       </p:transition>
     </mc:Choice>
-    <mc:Fallback>
+    <mc:Fallback xmlns="">
       <p:transition spd="med">
         <p:fade/>
       </p:transition>
@@ -18655,21 +19350,21 @@
           </a:p>
           <a:p>
             <a:r>
-              <a:rPr lang="en-CA" dirty="0" smtClean="0"/>
+              <a:rPr lang="en-CA" i="1" dirty="0" smtClean="0"/>
               <a:t>System Metrics (MOOD):</a:t>
             </a:r>
           </a:p>
           <a:p>
             <a:pPr lvl="1"/>
             <a:r>
-              <a:rPr lang="en-CA" dirty="0" smtClean="0"/>
+              <a:rPr lang="en-CA" i="1" dirty="0" smtClean="0"/>
               <a:t>MHF</a:t>
             </a:r>
           </a:p>
           <a:p>
             <a:pPr lvl="1"/>
             <a:r>
-              <a:rPr lang="en-CA" dirty="0" smtClean="0"/>
+              <a:rPr lang="en-CA" i="1" dirty="0" smtClean="0"/>
               <a:t>AHF</a:t>
             </a:r>
           </a:p>
@@ -18751,13 +19446,13 @@
   <p:clrMapOvr>
     <a:masterClrMapping/>
   </p:clrMapOvr>
-  <mc:AlternateContent xmlns:mc="http://schemas.openxmlformats.org/markup-compatibility/2006">
-    <mc:Choice xmlns:p14="http://schemas.microsoft.com/office/powerpoint/2010/main" Requires="p14">
+  <mc:AlternateContent xmlns:mc="http://schemas.openxmlformats.org/markup-compatibility/2006" xmlns:p14="http://schemas.microsoft.com/office/powerpoint/2010/main">
+    <mc:Choice Requires="p14">
       <p:transition spd="med" p14:dur="700">
         <p:fade/>
       </p:transition>
     </mc:Choice>
-    <mc:Fallback>
+    <mc:Fallback xmlns="">
       <p:transition spd="med">
         <p:fade/>
       </p:transition>

</xml_diff>